<commit_message>
Computer networking report and presentation slides
</commit_message>
<xml_diff>
--- a/Modules/Computer Networking/Docs/Connection Point_7 (Slides).pptx
+++ b/Modules/Computer Networking/Docs/Connection Point_7 (Slides).pptx
@@ -246,7 +246,7 @@
           <a:p>
             <a:fld id="{0D9AD9D3-B4BD-4FCC-876D-523289521EEA}" type="datetimeFigureOut">
               <a:rPr lang="en-GB" smtClean="0"/>
-              <a:t>09/03/2016</a:t>
+              <a:t>14/03/2016</a:t>
             </a:fld>
             <a:endParaRPr lang="en-GB"/>
           </a:p>
@@ -416,7 +416,7 @@
           <a:p>
             <a:fld id="{0D9AD9D3-B4BD-4FCC-876D-523289521EEA}" type="datetimeFigureOut">
               <a:rPr lang="en-GB" smtClean="0"/>
-              <a:t>09/03/2016</a:t>
+              <a:t>14/03/2016</a:t>
             </a:fld>
             <a:endParaRPr lang="en-GB"/>
           </a:p>
@@ -596,7 +596,7 @@
           <a:p>
             <a:fld id="{0D9AD9D3-B4BD-4FCC-876D-523289521EEA}" type="datetimeFigureOut">
               <a:rPr lang="en-GB" smtClean="0"/>
-              <a:t>09/03/2016</a:t>
+              <a:t>14/03/2016</a:t>
             </a:fld>
             <a:endParaRPr lang="en-GB"/>
           </a:p>
@@ -766,7 +766,7 @@
           <a:p>
             <a:fld id="{0D9AD9D3-B4BD-4FCC-876D-523289521EEA}" type="datetimeFigureOut">
               <a:rPr lang="en-GB" smtClean="0"/>
-              <a:t>09/03/2016</a:t>
+              <a:t>14/03/2016</a:t>
             </a:fld>
             <a:endParaRPr lang="en-GB"/>
           </a:p>
@@ -1012,7 +1012,7 @@
           <a:p>
             <a:fld id="{0D9AD9D3-B4BD-4FCC-876D-523289521EEA}" type="datetimeFigureOut">
               <a:rPr lang="en-GB" smtClean="0"/>
-              <a:t>09/03/2016</a:t>
+              <a:t>14/03/2016</a:t>
             </a:fld>
             <a:endParaRPr lang="en-GB"/>
           </a:p>
@@ -1244,7 +1244,7 @@
           <a:p>
             <a:fld id="{0D9AD9D3-B4BD-4FCC-876D-523289521EEA}" type="datetimeFigureOut">
               <a:rPr lang="en-GB" smtClean="0"/>
-              <a:t>09/03/2016</a:t>
+              <a:t>14/03/2016</a:t>
             </a:fld>
             <a:endParaRPr lang="en-GB"/>
           </a:p>
@@ -1611,7 +1611,7 @@
           <a:p>
             <a:fld id="{0D9AD9D3-B4BD-4FCC-876D-523289521EEA}" type="datetimeFigureOut">
               <a:rPr lang="en-GB" smtClean="0"/>
-              <a:t>09/03/2016</a:t>
+              <a:t>14/03/2016</a:t>
             </a:fld>
             <a:endParaRPr lang="en-GB"/>
           </a:p>
@@ -1729,7 +1729,7 @@
           <a:p>
             <a:fld id="{0D9AD9D3-B4BD-4FCC-876D-523289521EEA}" type="datetimeFigureOut">
               <a:rPr lang="en-GB" smtClean="0"/>
-              <a:t>09/03/2016</a:t>
+              <a:t>14/03/2016</a:t>
             </a:fld>
             <a:endParaRPr lang="en-GB"/>
           </a:p>
@@ -1824,7 +1824,7 @@
           <a:p>
             <a:fld id="{0D9AD9D3-B4BD-4FCC-876D-523289521EEA}" type="datetimeFigureOut">
               <a:rPr lang="en-GB" smtClean="0"/>
-              <a:t>09/03/2016</a:t>
+              <a:t>14/03/2016</a:t>
             </a:fld>
             <a:endParaRPr lang="en-GB"/>
           </a:p>
@@ -2101,7 +2101,7 @@
           <a:p>
             <a:fld id="{0D9AD9D3-B4BD-4FCC-876D-523289521EEA}" type="datetimeFigureOut">
               <a:rPr lang="en-GB" smtClean="0"/>
-              <a:t>09/03/2016</a:t>
+              <a:t>14/03/2016</a:t>
             </a:fld>
             <a:endParaRPr lang="en-GB"/>
           </a:p>
@@ -2354,7 +2354,7 @@
           <a:p>
             <a:fld id="{0D9AD9D3-B4BD-4FCC-876D-523289521EEA}" type="datetimeFigureOut">
               <a:rPr lang="en-GB" smtClean="0"/>
-              <a:t>09/03/2016</a:t>
+              <a:t>14/03/2016</a:t>
             </a:fld>
             <a:endParaRPr lang="en-GB"/>
           </a:p>
@@ -2567,7 +2567,7 @@
           <a:p>
             <a:fld id="{0D9AD9D3-B4BD-4FCC-876D-523289521EEA}" type="datetimeFigureOut">
               <a:rPr lang="en-GB" smtClean="0"/>
-              <a:t>09/03/2016</a:t>
+              <a:t>14/03/2016</a:t>
             </a:fld>
             <a:endParaRPr lang="en-GB"/>
           </a:p>
@@ -2995,9 +2995,71 @@
           </a:p>
         </p:txBody>
       </p:sp>
+      <p:sp>
+        <p:nvSpPr>
+          <p:cNvPr id="5" name="TextBox 4"/>
+          <p:cNvSpPr txBox="1"/>
+          <p:nvPr/>
+        </p:nvSpPr>
+        <p:spPr>
+          <a:xfrm>
+            <a:off x="7902054" y="1311418"/>
+            <a:ext cx="3760527" cy="4524315"/>
+          </a:xfrm>
+          <a:prstGeom prst="rect">
+            <a:avLst/>
+          </a:prstGeom>
+          <a:noFill/>
+        </p:spPr>
+        <p:txBody>
+          <a:bodyPr wrap="square" rtlCol="0">
+            <a:spAutoFit/>
+          </a:bodyPr>
+          <a:lstStyle/>
+          <a:p>
+            <a:pPr marL="285750" indent="-285750">
+              <a:buFont typeface="Arial" panose="020B0604020202020204" pitchFamily="34" charset="0"/>
+              <a:buChar char="•"/>
+            </a:pPr>
+            <a:r>
+              <a:rPr lang="en-GB" sz="2400" dirty="0" smtClean="0"/>
+              <a:t>Point 7 manages the connection of the 3D Printer network and its connection to business network.</a:t>
+            </a:r>
+          </a:p>
+          <a:p>
+            <a:pPr marL="285750" indent="-285750">
+              <a:buFont typeface="Arial" panose="020B0604020202020204" pitchFamily="34" charset="0"/>
+              <a:buChar char="•"/>
+            </a:pPr>
+            <a:r>
+              <a:rPr lang="en-GB" sz="2400" dirty="0" smtClean="0"/>
+              <a:t>Main Considerations are connection speed, reliability, security and cost.</a:t>
+            </a:r>
+          </a:p>
+          <a:p>
+            <a:pPr marL="285750" indent="-285750">
+              <a:buFont typeface="Arial" panose="020B0604020202020204" pitchFamily="34" charset="0"/>
+              <a:buChar char="•"/>
+            </a:pPr>
+            <a:r>
+              <a:rPr lang="en-GB" sz="2400" dirty="0" smtClean="0"/>
+              <a:t>Majority of 3D printer technologies (FDM, SLA) connect via USB or </a:t>
+            </a:r>
+            <a:r>
+              <a:rPr lang="en-GB" sz="2400" dirty="0" err="1" smtClean="0"/>
+              <a:t>Wi-fi</a:t>
+            </a:r>
+            <a:r>
+              <a:rPr lang="en-GB" sz="2400" dirty="0" smtClean="0"/>
+              <a:t>.</a:t>
+            </a:r>
+            <a:endParaRPr lang="en-GB" sz="2400" dirty="0"/>
+          </a:p>
+        </p:txBody>
+      </p:sp>
       <p:pic>
         <p:nvPicPr>
-          <p:cNvPr id="4" name="Content Placeholder 3"/>
+          <p:cNvPr id="6" name="Content Placeholder 5"/>
           <p:cNvPicPr>
             <a:picLocks noGrp="1" noChangeAspect="1"/>
           </p:cNvPicPr>
@@ -3019,73 +3081,11 @@
         </p:blipFill>
         <p:spPr>
           <a:xfrm>
-            <a:off x="529419" y="1311418"/>
-            <a:ext cx="7227627" cy="5411454"/>
+            <a:off x="951907" y="1311417"/>
+            <a:ext cx="6759077" cy="5060643"/>
           </a:xfrm>
         </p:spPr>
       </p:pic>
-      <p:sp>
-        <p:nvSpPr>
-          <p:cNvPr id="5" name="TextBox 4"/>
-          <p:cNvSpPr txBox="1"/>
-          <p:nvPr/>
-        </p:nvSpPr>
-        <p:spPr>
-          <a:xfrm>
-            <a:off x="7902054" y="1311418"/>
-            <a:ext cx="3760527" cy="4524315"/>
-          </a:xfrm>
-          <a:prstGeom prst="rect">
-            <a:avLst/>
-          </a:prstGeom>
-          <a:noFill/>
-        </p:spPr>
-        <p:txBody>
-          <a:bodyPr wrap="square" rtlCol="0">
-            <a:spAutoFit/>
-          </a:bodyPr>
-          <a:lstStyle/>
-          <a:p>
-            <a:pPr marL="285750" indent="-285750">
-              <a:buFont typeface="Arial" panose="020B0604020202020204" pitchFamily="34" charset="0"/>
-              <a:buChar char="•"/>
-            </a:pPr>
-            <a:r>
-              <a:rPr lang="en-GB" sz="2400" dirty="0" smtClean="0"/>
-              <a:t>Point 7 manages the connection of the 3D Printer network and its connection to business network.</a:t>
-            </a:r>
-          </a:p>
-          <a:p>
-            <a:pPr marL="285750" indent="-285750">
-              <a:buFont typeface="Arial" panose="020B0604020202020204" pitchFamily="34" charset="0"/>
-              <a:buChar char="•"/>
-            </a:pPr>
-            <a:r>
-              <a:rPr lang="en-GB" sz="2400" dirty="0" smtClean="0"/>
-              <a:t>Main Considerations are connection speed, reliability, security and cost.</a:t>
-            </a:r>
-          </a:p>
-          <a:p>
-            <a:pPr marL="285750" indent="-285750">
-              <a:buFont typeface="Arial" panose="020B0604020202020204" pitchFamily="34" charset="0"/>
-              <a:buChar char="•"/>
-            </a:pPr>
-            <a:r>
-              <a:rPr lang="en-GB" sz="2400" dirty="0" smtClean="0"/>
-              <a:t>Majority of 3D printer technologies (FDM, SLA) connect via USB or </a:t>
-            </a:r>
-            <a:r>
-              <a:rPr lang="en-GB" sz="2400" dirty="0" err="1" smtClean="0"/>
-              <a:t>Wi-fi</a:t>
-            </a:r>
-            <a:r>
-              <a:rPr lang="en-GB" sz="2400" dirty="0" smtClean="0"/>
-              <a:t>.</a:t>
-            </a:r>
-            <a:endParaRPr lang="en-GB" sz="2400" dirty="0"/>
-          </a:p>
-        </p:txBody>
-      </p:sp>
     </p:spTree>
     <p:extLst>
       <p:ext uri="{BB962C8B-B14F-4D97-AF65-F5344CB8AC3E}">
@@ -3171,8 +3171,13 @@
             </a:pPr>
             <a:r>
               <a:rPr lang="en-GB" dirty="0" smtClean="0"/>
-              <a:t>USB Hub</a:t>
-            </a:r>
+              <a:t>USB </a:t>
+            </a:r>
+            <a:r>
+              <a:rPr lang="en-GB" dirty="0" smtClean="0"/>
+              <a:t>Hub, USB 2.0/3.0 Cabling</a:t>
+            </a:r>
+            <a:endParaRPr lang="en-GB" dirty="0" smtClean="0"/>
           </a:p>
           <a:p>
             <a:pPr lvl="1">
@@ -3181,8 +3186,36 @@
             </a:pPr>
             <a:r>
               <a:rPr lang="en-GB" dirty="0" smtClean="0"/>
-              <a:t>USB Switch</a:t>
-            </a:r>
+              <a:t>Automatic </a:t>
+            </a:r>
+            <a:r>
+              <a:rPr lang="en-GB" dirty="0"/>
+              <a:t>Printer </a:t>
+            </a:r>
+            <a:r>
+              <a:rPr lang="en-GB" dirty="0" smtClean="0"/>
+              <a:t>Switch (</a:t>
+            </a:r>
+            <a:r>
+              <a:rPr lang="en-GB" dirty="0" smtClean="0"/>
+              <a:t>Ethernet), USB </a:t>
+            </a:r>
+            <a:r>
+              <a:rPr lang="en-GB" dirty="0" smtClean="0"/>
+              <a:t>to Ethernet </a:t>
+            </a:r>
+            <a:r>
+              <a:rPr lang="en-GB" dirty="0" smtClean="0"/>
+              <a:t>Adapter</a:t>
+            </a:r>
+            <a:endParaRPr lang="en-GB" dirty="0"/>
+          </a:p>
+          <a:p>
+            <a:r>
+              <a:rPr lang="en-GB" dirty="0" smtClean="0"/>
+              <a:t>Wireless</a:t>
+            </a:r>
+            <a:endParaRPr lang="en-GB" dirty="0"/>
           </a:p>
           <a:p>
             <a:pPr lvl="1">
@@ -3191,16 +3224,9 @@
             </a:pPr>
             <a:r>
               <a:rPr lang="en-GB" dirty="0" smtClean="0"/>
-              <a:t>Automatic </a:t>
-            </a:r>
-            <a:r>
-              <a:rPr lang="en-GB" dirty="0"/>
-              <a:t>Printer </a:t>
-            </a:r>
-            <a:r>
-              <a:rPr lang="en-GB" dirty="0" smtClean="0"/>
-              <a:t>Switch (Ethernet)</a:t>
-            </a:r>
+              <a:t>Router </a:t>
+            </a:r>
+            <a:endParaRPr lang="en-GB" dirty="0" smtClean="0"/>
           </a:p>
           <a:p>
             <a:pPr lvl="1">
@@ -3209,46 +3235,9 @@
             </a:pPr>
             <a:r>
               <a:rPr lang="en-GB" dirty="0" smtClean="0"/>
-              <a:t>USB to Ethernet Adapter</a:t>
-            </a:r>
-          </a:p>
-          <a:p>
-            <a:pPr lvl="1">
-              <a:buFontTx/>
-              <a:buChar char="-"/>
-            </a:pPr>
-            <a:r>
-              <a:rPr lang="en-GB" dirty="0" smtClean="0"/>
-              <a:t>Ethernet Network Switch</a:t>
-            </a:r>
-            <a:endParaRPr lang="en-GB" dirty="0"/>
-          </a:p>
-          <a:p>
-            <a:r>
-              <a:rPr lang="en-GB" dirty="0" smtClean="0"/>
-              <a:t>Wireless</a:t>
-            </a:r>
-            <a:endParaRPr lang="en-GB" dirty="0"/>
-          </a:p>
-          <a:p>
-            <a:pPr lvl="1">
-              <a:buFontTx/>
-              <a:buChar char="-"/>
-            </a:pPr>
-            <a:r>
-              <a:rPr lang="en-GB" dirty="0" smtClean="0"/>
-              <a:t>Router</a:t>
-            </a:r>
-          </a:p>
-          <a:p>
-            <a:pPr lvl="1">
-              <a:buFontTx/>
-              <a:buChar char="-"/>
-            </a:pPr>
-            <a:r>
-              <a:rPr lang="en-GB" dirty="0" smtClean="0"/>
-              <a:t>Hub</a:t>
-            </a:r>
+              <a:t>Wireless Hub</a:t>
+            </a:r>
+            <a:endParaRPr lang="en-GB" dirty="0" smtClean="0"/>
           </a:p>
           <a:p>
             <a:pPr lvl="1">
@@ -3549,87 +3538,27 @@
             </a:r>
             <a:r>
               <a:rPr lang="en-GB" sz="2400" dirty="0"/>
-              <a:t>3D printers will be connected to the console with a physical network of USB cabling </a:t>
+              <a:t>3D printers will be connected to </a:t>
             </a:r>
             <a:r>
               <a:rPr lang="en-GB" sz="2400" dirty="0" smtClean="0"/>
-              <a:t>to a Hub.</a:t>
+              <a:t>a wireless router</a:t>
+            </a:r>
+            <a:r>
+              <a:rPr lang="en-GB" sz="2400" dirty="0"/>
+              <a:t> </a:t>
+            </a:r>
+            <a:r>
+              <a:rPr lang="en-GB" sz="2400" dirty="0" smtClean="0"/>
+              <a:t>located at point 5.</a:t>
             </a:r>
           </a:p>
           <a:p>
             <a:pPr marL="285750" indent="-285750"/>
             <a:r>
               <a:rPr lang="en-GB" sz="2400" dirty="0" smtClean="0"/>
-              <a:t>Hubs and USB cabling compatible with USB 2.0/3.0.</a:t>
-            </a:r>
-          </a:p>
-          <a:p>
-            <a:pPr marL="285750" indent="-285750"/>
-            <a:r>
-              <a:rPr lang="en-GB" sz="2400" dirty="0" smtClean="0"/>
-              <a:t>Main </a:t>
-            </a:r>
-            <a:r>
-              <a:rPr lang="en-GB" sz="2400" dirty="0"/>
-              <a:t>use of the network is via USB</a:t>
-            </a:r>
-            <a:r>
-              <a:rPr lang="en-GB" sz="2400" dirty="0" smtClean="0"/>
-              <a:t>.</a:t>
-            </a:r>
-          </a:p>
-          <a:p>
-            <a:pPr marL="285750" indent="-285750"/>
-            <a:r>
-              <a:rPr lang="en-GB" sz="2400" dirty="0" smtClean="0"/>
-              <a:t>Suggest </a:t>
-            </a:r>
-            <a:r>
-              <a:rPr lang="en-GB" sz="2400" dirty="0"/>
-              <a:t>that a Wi-Fi router be installed </a:t>
-            </a:r>
-            <a:r>
-              <a:rPr lang="en-GB" sz="2400" dirty="0" smtClean="0"/>
-              <a:t>as a </a:t>
-            </a:r>
-            <a:r>
-              <a:rPr lang="en-GB" sz="2400" dirty="0"/>
-              <a:t>back up system in the event that </a:t>
-            </a:r>
-            <a:r>
-              <a:rPr lang="en-GB" sz="2400" dirty="0" smtClean="0"/>
-              <a:t>there are </a:t>
-            </a:r>
-            <a:r>
-              <a:rPr lang="en-GB" sz="2400" dirty="0"/>
-              <a:t>issues </a:t>
-            </a:r>
-            <a:r>
-              <a:rPr lang="en-GB" sz="2400" dirty="0" smtClean="0"/>
-              <a:t>USB </a:t>
-            </a:r>
-            <a:r>
-              <a:rPr lang="en-GB" sz="2400" dirty="0"/>
-              <a:t>connection</a:t>
-            </a:r>
-            <a:r>
-              <a:rPr lang="en-GB" sz="2400" dirty="0" smtClean="0"/>
-              <a:t>. </a:t>
-            </a:r>
-            <a:r>
-              <a:rPr lang="en-GB" sz="2400" dirty="0"/>
-              <a:t>C</a:t>
-            </a:r>
-            <a:r>
-              <a:rPr lang="en-GB" sz="2400" dirty="0" smtClean="0"/>
-              <a:t>heap and easy to install.</a:t>
-            </a:r>
-            <a:endParaRPr lang="en-GB" sz="2400" dirty="0"/>
-          </a:p>
-          <a:p>
-            <a:pPr marL="0" indent="0">
-              <a:buNone/>
-            </a:pPr>
+              <a:t>Technical staff will be able to connect to the network via Wi-Fi from anywhere in warehouse. This allows the management console/s to be portable.</a:t>
+            </a:r>
             <a:endParaRPr lang="en-GB" dirty="0"/>
           </a:p>
         </p:txBody>

</xml_diff>

<commit_message>
zone 3 updated. Added lights ans box colliders to models
</commit_message>
<xml_diff>
--- a/Modules/Computer Networking/Docs/Connection Point_7 (Slides).pptx
+++ b/Modules/Computer Networking/Docs/Connection Point_7 (Slides).pptx
@@ -246,7 +246,7 @@
           <a:p>
             <a:fld id="{0D9AD9D3-B4BD-4FCC-876D-523289521EEA}" type="datetimeFigureOut">
               <a:rPr lang="en-GB" smtClean="0"/>
-              <a:t>14/03/2016</a:t>
+              <a:t>17/03/2016</a:t>
             </a:fld>
             <a:endParaRPr lang="en-GB"/>
           </a:p>
@@ -416,7 +416,7 @@
           <a:p>
             <a:fld id="{0D9AD9D3-B4BD-4FCC-876D-523289521EEA}" type="datetimeFigureOut">
               <a:rPr lang="en-GB" smtClean="0"/>
-              <a:t>14/03/2016</a:t>
+              <a:t>17/03/2016</a:t>
             </a:fld>
             <a:endParaRPr lang="en-GB"/>
           </a:p>
@@ -596,7 +596,7 @@
           <a:p>
             <a:fld id="{0D9AD9D3-B4BD-4FCC-876D-523289521EEA}" type="datetimeFigureOut">
               <a:rPr lang="en-GB" smtClean="0"/>
-              <a:t>14/03/2016</a:t>
+              <a:t>17/03/2016</a:t>
             </a:fld>
             <a:endParaRPr lang="en-GB"/>
           </a:p>
@@ -766,7 +766,7 @@
           <a:p>
             <a:fld id="{0D9AD9D3-B4BD-4FCC-876D-523289521EEA}" type="datetimeFigureOut">
               <a:rPr lang="en-GB" smtClean="0"/>
-              <a:t>14/03/2016</a:t>
+              <a:t>17/03/2016</a:t>
             </a:fld>
             <a:endParaRPr lang="en-GB"/>
           </a:p>
@@ -1012,7 +1012,7 @@
           <a:p>
             <a:fld id="{0D9AD9D3-B4BD-4FCC-876D-523289521EEA}" type="datetimeFigureOut">
               <a:rPr lang="en-GB" smtClean="0"/>
-              <a:t>14/03/2016</a:t>
+              <a:t>17/03/2016</a:t>
             </a:fld>
             <a:endParaRPr lang="en-GB"/>
           </a:p>
@@ -1244,7 +1244,7 @@
           <a:p>
             <a:fld id="{0D9AD9D3-B4BD-4FCC-876D-523289521EEA}" type="datetimeFigureOut">
               <a:rPr lang="en-GB" smtClean="0"/>
-              <a:t>14/03/2016</a:t>
+              <a:t>17/03/2016</a:t>
             </a:fld>
             <a:endParaRPr lang="en-GB"/>
           </a:p>
@@ -1611,7 +1611,7 @@
           <a:p>
             <a:fld id="{0D9AD9D3-B4BD-4FCC-876D-523289521EEA}" type="datetimeFigureOut">
               <a:rPr lang="en-GB" smtClean="0"/>
-              <a:t>14/03/2016</a:t>
+              <a:t>17/03/2016</a:t>
             </a:fld>
             <a:endParaRPr lang="en-GB"/>
           </a:p>
@@ -1729,7 +1729,7 @@
           <a:p>
             <a:fld id="{0D9AD9D3-B4BD-4FCC-876D-523289521EEA}" type="datetimeFigureOut">
               <a:rPr lang="en-GB" smtClean="0"/>
-              <a:t>14/03/2016</a:t>
+              <a:t>17/03/2016</a:t>
             </a:fld>
             <a:endParaRPr lang="en-GB"/>
           </a:p>
@@ -1824,7 +1824,7 @@
           <a:p>
             <a:fld id="{0D9AD9D3-B4BD-4FCC-876D-523289521EEA}" type="datetimeFigureOut">
               <a:rPr lang="en-GB" smtClean="0"/>
-              <a:t>14/03/2016</a:t>
+              <a:t>17/03/2016</a:t>
             </a:fld>
             <a:endParaRPr lang="en-GB"/>
           </a:p>
@@ -2101,7 +2101,7 @@
           <a:p>
             <a:fld id="{0D9AD9D3-B4BD-4FCC-876D-523289521EEA}" type="datetimeFigureOut">
               <a:rPr lang="en-GB" smtClean="0"/>
-              <a:t>14/03/2016</a:t>
+              <a:t>17/03/2016</a:t>
             </a:fld>
             <a:endParaRPr lang="en-GB"/>
           </a:p>
@@ -2354,7 +2354,7 @@
           <a:p>
             <a:fld id="{0D9AD9D3-B4BD-4FCC-876D-523289521EEA}" type="datetimeFigureOut">
               <a:rPr lang="en-GB" smtClean="0"/>
-              <a:t>14/03/2016</a:t>
+              <a:t>17/03/2016</a:t>
             </a:fld>
             <a:endParaRPr lang="en-GB"/>
           </a:p>
@@ -2567,7 +2567,7 @@
           <a:p>
             <a:fld id="{0D9AD9D3-B4BD-4FCC-876D-523289521EEA}" type="datetimeFigureOut">
               <a:rPr lang="en-GB" smtClean="0"/>
-              <a:t>14/03/2016</a:t>
+              <a:t>17/03/2016</a:t>
             </a:fld>
             <a:endParaRPr lang="en-GB"/>
           </a:p>
@@ -3004,7 +3004,7 @@
         <p:spPr>
           <a:xfrm>
             <a:off x="7902054" y="1311418"/>
-            <a:ext cx="3760527" cy="4524315"/>
+            <a:ext cx="3760527" cy="4154984"/>
           </a:xfrm>
           <a:prstGeom prst="rect">
             <a:avLst/>
@@ -3023,7 +3023,31 @@
             </a:pPr>
             <a:r>
               <a:rPr lang="en-GB" sz="2400" dirty="0" smtClean="0"/>
-              <a:t>Point 7 manages the connection of the 3D Printer network and its connection to business network.</a:t>
+              <a:t>Point 7 </a:t>
+            </a:r>
+            <a:r>
+              <a:rPr lang="en-GB" sz="2400" dirty="0" smtClean="0"/>
+              <a:t>will manage </a:t>
+            </a:r>
+            <a:r>
+              <a:rPr lang="en-GB" sz="2400" dirty="0" smtClean="0"/>
+              <a:t>the connection of the 3D </a:t>
+            </a:r>
+            <a:r>
+              <a:rPr lang="en-GB" sz="2400" dirty="0" smtClean="0"/>
+              <a:t>Printers </a:t>
+            </a:r>
+            <a:r>
+              <a:rPr lang="en-GB" sz="2400" dirty="0" smtClean="0"/>
+              <a:t>network </a:t>
+            </a:r>
+            <a:r>
+              <a:rPr lang="en-GB" sz="2400" dirty="0" smtClean="0"/>
+              <a:t>to the </a:t>
+            </a:r>
+            <a:r>
+              <a:rPr lang="en-GB" sz="2400" dirty="0" smtClean="0"/>
+              <a:t>business network.</a:t>
             </a:r>
           </a:p>
           <a:p>
@@ -3033,7 +3057,15 @@
             </a:pPr>
             <a:r>
               <a:rPr lang="en-GB" sz="2400" dirty="0" smtClean="0"/>
-              <a:t>Main Considerations are connection speed, reliability, security and cost.</a:t>
+              <a:t>Main Considerations are connection speed, reliability</a:t>
+            </a:r>
+            <a:r>
+              <a:rPr lang="en-GB" sz="2400" dirty="0" smtClean="0"/>
+              <a:t>, mobility, </a:t>
+            </a:r>
+            <a:r>
+              <a:rPr lang="en-GB" sz="2400" dirty="0" smtClean="0"/>
+              <a:t>security and cost.</a:t>
             </a:r>
           </a:p>
           <a:p>
@@ -3046,8 +3078,8 @@
               <a:t>Majority of 3D printer technologies (FDM, SLA) connect via USB or </a:t>
             </a:r>
             <a:r>
-              <a:rPr lang="en-GB" sz="2400" dirty="0" err="1" smtClean="0"/>
-              <a:t>Wi-fi</a:t>
+              <a:rPr lang="en-GB" sz="2400" dirty="0" smtClean="0"/>
+              <a:t>Wi-Fi</a:t>
             </a:r>
             <a:r>
               <a:rPr lang="en-GB" sz="2400" dirty="0" smtClean="0"/>
@@ -3159,10 +3191,14 @@
           <a:bodyPr/>
           <a:lstStyle/>
           <a:p>
+            <a:endParaRPr lang="en-GB" dirty="0" smtClean="0"/>
+          </a:p>
+          <a:p>
             <a:r>
               <a:rPr lang="en-GB" dirty="0" smtClean="0"/>
               <a:t>Wired</a:t>
             </a:r>
+            <a:endParaRPr lang="en-GB" dirty="0" smtClean="0"/>
           </a:p>
           <a:p>
             <a:pPr lvl="1">
@@ -3171,44 +3207,19 @@
             </a:pPr>
             <a:r>
               <a:rPr lang="en-GB" dirty="0" smtClean="0"/>
-              <a:t>USB </a:t>
+              <a:t>USB Hub, USB 2.0/3.0 </a:t>
             </a:r>
             <a:r>
               <a:rPr lang="en-GB" dirty="0" smtClean="0"/>
-              <a:t>Hub, USB 2.0/3.0 Cabling</a:t>
-            </a:r>
-            <a:endParaRPr lang="en-GB" dirty="0" smtClean="0"/>
+              <a:t>Cabling</a:t>
+            </a:r>
           </a:p>
           <a:p>
             <a:pPr lvl="1">
               <a:buFontTx/>
               <a:buChar char="-"/>
             </a:pPr>
-            <a:r>
-              <a:rPr lang="en-GB" dirty="0" smtClean="0"/>
-              <a:t>Automatic </a:t>
-            </a:r>
-            <a:r>
-              <a:rPr lang="en-GB" dirty="0"/>
-              <a:t>Printer </a:t>
-            </a:r>
-            <a:r>
-              <a:rPr lang="en-GB" dirty="0" smtClean="0"/>
-              <a:t>Switch (</a:t>
-            </a:r>
-            <a:r>
-              <a:rPr lang="en-GB" dirty="0" smtClean="0"/>
-              <a:t>Ethernet), USB </a:t>
-            </a:r>
-            <a:r>
-              <a:rPr lang="en-GB" dirty="0" smtClean="0"/>
-              <a:t>to Ethernet </a:t>
-            </a:r>
-            <a:r>
-              <a:rPr lang="en-GB" dirty="0" smtClean="0"/>
-              <a:t>Adapter</a:t>
-            </a:r>
-            <a:endParaRPr lang="en-GB" dirty="0"/>
+            <a:endParaRPr lang="en-GB" dirty="0" smtClean="0"/>
           </a:p>
           <a:p>
             <a:r>
@@ -3226,7 +3237,6 @@
               <a:rPr lang="en-GB" dirty="0" smtClean="0"/>
               <a:t>Router </a:t>
             </a:r>
-            <a:endParaRPr lang="en-GB" dirty="0" smtClean="0"/>
           </a:p>
           <a:p>
             <a:pPr lvl="1">
@@ -3235,19 +3245,13 @@
             </a:pPr>
             <a:r>
               <a:rPr lang="en-GB" dirty="0" smtClean="0"/>
-              <a:t>Wireless Hub</a:t>
+              <a:t>Wireless </a:t>
+            </a:r>
+            <a:r>
+              <a:rPr lang="en-GB" dirty="0" smtClean="0"/>
+              <a:t>Hub</a:t>
             </a:r>
             <a:endParaRPr lang="en-GB" dirty="0" smtClean="0"/>
-          </a:p>
-          <a:p>
-            <a:pPr lvl="1">
-              <a:buFontTx/>
-              <a:buChar char="-"/>
-            </a:pPr>
-            <a:r>
-              <a:rPr lang="en-GB" dirty="0" smtClean="0"/>
-              <a:t>Repeater</a:t>
-            </a:r>
           </a:p>
         </p:txBody>
       </p:sp>
@@ -3550,15 +3554,67 @@
             </a:r>
             <a:r>
               <a:rPr lang="en-GB" sz="2400" dirty="0" smtClean="0"/>
-              <a:t>located at point 5.</a:t>
+              <a:t>located at point 5</a:t>
+            </a:r>
+            <a:r>
+              <a:rPr lang="en-GB" sz="2400" dirty="0" smtClean="0"/>
+              <a:t>.</a:t>
             </a:r>
           </a:p>
           <a:p>
             <a:pPr marL="285750" indent="-285750"/>
             <a:r>
               <a:rPr lang="en-GB" sz="2400" dirty="0" smtClean="0"/>
-              <a:t>Technical staff will be able to connect to the network via Wi-Fi from anywhere in warehouse. This allows the management console/s to be portable.</a:t>
-            </a:r>
+              <a:t>The reliability of wireless network services can be managed easier within a controlled environment such as the warehouse. (Reliability)</a:t>
+            </a:r>
+            <a:endParaRPr lang="en-GB" sz="2400" dirty="0" smtClean="0"/>
+          </a:p>
+          <a:p>
+            <a:pPr marL="285750" indent="-285750"/>
+            <a:r>
+              <a:rPr lang="en-GB" sz="2400" dirty="0" smtClean="0"/>
+              <a:t>Technical staff will be able to connect to the network via Wi-Fi from anywhere in warehouse. This allows the management console/s to be portable</a:t>
+            </a:r>
+            <a:r>
+              <a:rPr lang="en-GB" sz="2400" dirty="0" smtClean="0"/>
+              <a:t>. </a:t>
+            </a:r>
+            <a:r>
+              <a:rPr lang="en-GB" sz="2400" dirty="0" smtClean="0"/>
+              <a:t>(Mobility)</a:t>
+            </a:r>
+          </a:p>
+          <a:p>
+            <a:pPr marL="285750" indent="-285750"/>
+            <a:r>
+              <a:rPr lang="en-GB" sz="2400" dirty="0" smtClean="0"/>
+              <a:t>A cheaper option for instalment, maintenance and potential expansion (Cost)</a:t>
+            </a:r>
+          </a:p>
+          <a:p>
+            <a:pPr marL="285750" indent="-285750"/>
+            <a:r>
+              <a:rPr lang="en-GB" sz="2400" dirty="0" smtClean="0"/>
+              <a:t>Security less of a concern within the warehouse as access to the environment can be controlled (Security).</a:t>
+            </a:r>
+          </a:p>
+          <a:p>
+            <a:pPr marL="285750" indent="-285750"/>
+            <a:r>
+              <a:rPr lang="en-GB" sz="2400" dirty="0"/>
+              <a:t>Since the network printers will spend the majority of there time completing a print job and less time receiving data from the network wireless can support fast data rates for a 3D printer network. (Speed)   </a:t>
+            </a:r>
+            <a:r>
+              <a:rPr lang="en-GB" sz="2400" dirty="0" smtClean="0"/>
+              <a:t> </a:t>
+            </a:r>
+          </a:p>
+          <a:p>
+            <a:pPr marL="285750" indent="-285750"/>
+            <a:endParaRPr lang="en-GB" sz="2400" dirty="0" smtClean="0"/>
+          </a:p>
+          <a:p>
+            <a:pPr marL="285750" indent="-285750"/>
             <a:endParaRPr lang="en-GB" dirty="0"/>
           </a:p>
         </p:txBody>

</xml_diff>